<commit_message>
update fig1c with 1000 iterations
</commit_message>
<xml_diff>
--- a/analysis/plots/fig1.pptx
+++ b/analysis/plots/fig1.pptx
@@ -2,12 +2,12 @@
 <file path=ppt/presentation.xml><?xml version="1.0" encoding="utf-8"?>
 <p:presentation xmlns:a="http://schemas.openxmlformats.org/drawingml/2006/main" xmlns:r="http://schemas.openxmlformats.org/officeDocument/2006/relationships" xmlns:p="http://schemas.openxmlformats.org/presentationml/2006/main" saveSubsetFonts="1" autoCompressPictures="0">
   <p:sldMasterIdLst>
-    <p:sldMasterId id="2147483720" r:id="rId1"/>
+    <p:sldMasterId id="2147483756" r:id="rId1"/>
   </p:sldMasterIdLst>
   <p:sldIdLst>
     <p:sldId id="256" r:id="rId2"/>
   </p:sldIdLst>
-  <p:sldSz cx="10287000" cy="8915400"/>
+  <p:sldSz cx="10287000" cy="8458200"/>
   <p:notesSz cx="6858000" cy="9144000"/>
   <p:defaultTextStyle>
     <a:defPPr>
@@ -104,6 +104,11 @@
       </a:defRPr>
     </a:lvl9pPr>
   </p:defaultTextStyle>
+  <p:extLst>
+    <p:ext uri="{EFAFB233-063F-42B5-8137-9DF3F51BA10A}">
+      <p15:sldGuideLst xmlns:p15="http://schemas.microsoft.com/office/powerpoint/2012/main"/>
+    </p:ext>
+  </p:extLst>
 </p:presentation>
 </file>
 
@@ -136,8 +141,8 @@
         </p:nvSpPr>
         <p:spPr>
           <a:xfrm>
-            <a:off x="771525" y="1459072"/>
-            <a:ext cx="8743950" cy="3103880"/>
+            <a:off x="771525" y="1384248"/>
+            <a:ext cx="8743950" cy="2944707"/>
           </a:xfrm>
         </p:spPr>
         <p:txBody>
@@ -168,8 +173,8 @@
         </p:nvSpPr>
         <p:spPr>
           <a:xfrm>
-            <a:off x="1285875" y="4682649"/>
-            <a:ext cx="7715250" cy="2152491"/>
+            <a:off x="1285875" y="4442514"/>
+            <a:ext cx="7715250" cy="2042106"/>
           </a:xfrm>
         </p:spPr>
         <p:txBody>
@@ -238,7 +243,7 @@
           <a:p>
             <a:fld id="{DD4E2C3F-D803-BA45-B4A9-CD3B679F1D1E}" type="datetimeFigureOut">
               <a:rPr lang="en-US" smtClean="0"/>
-              <a:t>8/13/21</a:t>
+              <a:t>8/14/21</a:t>
             </a:fld>
             <a:endParaRPr lang="en-US"/>
           </a:p>
@@ -289,7 +294,7 @@
     </p:spTree>
     <p:extLst>
       <p:ext uri="{BB962C8B-B14F-4D97-AF65-F5344CB8AC3E}">
-        <p14:creationId xmlns:p14="http://schemas.microsoft.com/office/powerpoint/2010/main" val="831783809"/>
+        <p14:creationId xmlns:p14="http://schemas.microsoft.com/office/powerpoint/2010/main" val="1634223402"/>
       </p:ext>
     </p:extLst>
   </p:cSld>
@@ -408,7 +413,7 @@
           <a:p>
             <a:fld id="{DD4E2C3F-D803-BA45-B4A9-CD3B679F1D1E}" type="datetimeFigureOut">
               <a:rPr lang="en-US" smtClean="0"/>
-              <a:t>8/13/21</a:t>
+              <a:t>8/14/21</a:t>
             </a:fld>
             <a:endParaRPr lang="en-US"/>
           </a:p>
@@ -459,7 +464,7 @@
     </p:spTree>
     <p:extLst>
       <p:ext uri="{BB962C8B-B14F-4D97-AF65-F5344CB8AC3E}">
-        <p14:creationId xmlns:p14="http://schemas.microsoft.com/office/powerpoint/2010/main" val="1077011577"/>
+        <p14:creationId xmlns:p14="http://schemas.microsoft.com/office/powerpoint/2010/main" val="1477418759"/>
       </p:ext>
     </p:extLst>
   </p:cSld>
@@ -498,8 +503,8 @@
         </p:nvSpPr>
         <p:spPr>
           <a:xfrm>
-            <a:off x="7361635" y="474663"/>
-            <a:ext cx="2218134" cy="7555389"/>
+            <a:off x="7361635" y="450321"/>
+            <a:ext cx="2218134" cy="7167934"/>
           </a:xfrm>
         </p:spPr>
         <p:txBody>
@@ -526,8 +531,8 @@
         </p:nvSpPr>
         <p:spPr>
           <a:xfrm>
-            <a:off x="707232" y="474663"/>
-            <a:ext cx="6525816" cy="7555389"/>
+            <a:off x="707232" y="450321"/>
+            <a:ext cx="6525816" cy="7167934"/>
           </a:xfrm>
         </p:spPr>
         <p:txBody>
@@ -588,7 +593,7 @@
           <a:p>
             <a:fld id="{DD4E2C3F-D803-BA45-B4A9-CD3B679F1D1E}" type="datetimeFigureOut">
               <a:rPr lang="en-US" smtClean="0"/>
-              <a:t>8/13/21</a:t>
+              <a:t>8/14/21</a:t>
             </a:fld>
             <a:endParaRPr lang="en-US"/>
           </a:p>
@@ -639,7 +644,7 @@
     </p:spTree>
     <p:extLst>
       <p:ext uri="{BB962C8B-B14F-4D97-AF65-F5344CB8AC3E}">
-        <p14:creationId xmlns:p14="http://schemas.microsoft.com/office/powerpoint/2010/main" val="1659081503"/>
+        <p14:creationId xmlns:p14="http://schemas.microsoft.com/office/powerpoint/2010/main" val="89031656"/>
       </p:ext>
     </p:extLst>
   </p:cSld>
@@ -758,7 +763,7 @@
           <a:p>
             <a:fld id="{DD4E2C3F-D803-BA45-B4A9-CD3B679F1D1E}" type="datetimeFigureOut">
               <a:rPr lang="en-US" smtClean="0"/>
-              <a:t>8/13/21</a:t>
+              <a:t>8/14/21</a:t>
             </a:fld>
             <a:endParaRPr lang="en-US"/>
           </a:p>
@@ -809,7 +814,7 @@
     </p:spTree>
     <p:extLst>
       <p:ext uri="{BB962C8B-B14F-4D97-AF65-F5344CB8AC3E}">
-        <p14:creationId xmlns:p14="http://schemas.microsoft.com/office/powerpoint/2010/main" val="1494464640"/>
+        <p14:creationId xmlns:p14="http://schemas.microsoft.com/office/powerpoint/2010/main" val="528713893"/>
       </p:ext>
     </p:extLst>
   </p:cSld>
@@ -848,8 +853,8 @@
         </p:nvSpPr>
         <p:spPr>
           <a:xfrm>
-            <a:off x="701874" y="2222661"/>
-            <a:ext cx="8872538" cy="3708558"/>
+            <a:off x="701874" y="2108679"/>
+            <a:ext cx="8872538" cy="3518376"/>
           </a:xfrm>
         </p:spPr>
         <p:txBody>
@@ -880,8 +885,8 @@
         </p:nvSpPr>
         <p:spPr>
           <a:xfrm>
-            <a:off x="701874" y="5966304"/>
-            <a:ext cx="8872538" cy="1950243"/>
+            <a:off x="701874" y="5660339"/>
+            <a:ext cx="8872538" cy="1850231"/>
           </a:xfrm>
         </p:spPr>
         <p:txBody>
@@ -1002,7 +1007,7 @@
           <a:p>
             <a:fld id="{DD4E2C3F-D803-BA45-B4A9-CD3B679F1D1E}" type="datetimeFigureOut">
               <a:rPr lang="en-US" smtClean="0"/>
-              <a:t>8/13/21</a:t>
+              <a:t>8/14/21</a:t>
             </a:fld>
             <a:endParaRPr lang="en-US"/>
           </a:p>
@@ -1053,7 +1058,7 @@
     </p:spTree>
     <p:extLst>
       <p:ext uri="{BB962C8B-B14F-4D97-AF65-F5344CB8AC3E}">
-        <p14:creationId xmlns:p14="http://schemas.microsoft.com/office/powerpoint/2010/main" val="1128518804"/>
+        <p14:creationId xmlns:p14="http://schemas.microsoft.com/office/powerpoint/2010/main" val="1317664164"/>
       </p:ext>
     </p:extLst>
   </p:cSld>
@@ -1115,8 +1120,8 @@
         </p:nvSpPr>
         <p:spPr>
           <a:xfrm>
-            <a:off x="707231" y="2373313"/>
-            <a:ext cx="4371975" cy="5656739"/>
+            <a:off x="707231" y="2251604"/>
+            <a:ext cx="4371975" cy="5366650"/>
           </a:xfrm>
         </p:spPr>
         <p:txBody>
@@ -1172,8 +1177,8 @@
         </p:nvSpPr>
         <p:spPr>
           <a:xfrm>
-            <a:off x="5207794" y="2373313"/>
-            <a:ext cx="4371975" cy="5656739"/>
+            <a:off x="5207794" y="2251604"/>
+            <a:ext cx="4371975" cy="5366650"/>
           </a:xfrm>
         </p:spPr>
         <p:txBody>
@@ -1234,7 +1239,7 @@
           <a:p>
             <a:fld id="{DD4E2C3F-D803-BA45-B4A9-CD3B679F1D1E}" type="datetimeFigureOut">
               <a:rPr lang="en-US" smtClean="0"/>
-              <a:t>8/13/21</a:t>
+              <a:t>8/14/21</a:t>
             </a:fld>
             <a:endParaRPr lang="en-US"/>
           </a:p>
@@ -1285,7 +1290,7 @@
     </p:spTree>
     <p:extLst>
       <p:ext uri="{BB962C8B-B14F-4D97-AF65-F5344CB8AC3E}">
-        <p14:creationId xmlns:p14="http://schemas.microsoft.com/office/powerpoint/2010/main" val="2716318051"/>
+        <p14:creationId xmlns:p14="http://schemas.microsoft.com/office/powerpoint/2010/main" val="3869668433"/>
       </p:ext>
     </p:extLst>
   </p:cSld>
@@ -1324,8 +1329,8 @@
         </p:nvSpPr>
         <p:spPr>
           <a:xfrm>
-            <a:off x="708571" y="474664"/>
-            <a:ext cx="8872538" cy="1723232"/>
+            <a:off x="708571" y="450323"/>
+            <a:ext cx="8872538" cy="1634861"/>
           </a:xfrm>
         </p:spPr>
         <p:txBody>
@@ -1352,8 +1357,8 @@
         </p:nvSpPr>
         <p:spPr>
           <a:xfrm>
-            <a:off x="708572" y="2185512"/>
-            <a:ext cx="4351883" cy="1071086"/>
+            <a:off x="708572" y="2073434"/>
+            <a:ext cx="4351883" cy="1016158"/>
           </a:xfrm>
         </p:spPr>
         <p:txBody>
@@ -1417,8 +1422,8 @@
         </p:nvSpPr>
         <p:spPr>
           <a:xfrm>
-            <a:off x="708572" y="3256598"/>
-            <a:ext cx="4351883" cy="4789964"/>
+            <a:off x="708572" y="3089593"/>
+            <a:ext cx="4351883" cy="4544325"/>
           </a:xfrm>
         </p:spPr>
         <p:txBody>
@@ -1474,8 +1479,8 @@
         </p:nvSpPr>
         <p:spPr>
           <a:xfrm>
-            <a:off x="5207794" y="2185512"/>
-            <a:ext cx="4373315" cy="1071086"/>
+            <a:off x="5207794" y="2073434"/>
+            <a:ext cx="4373315" cy="1016158"/>
           </a:xfrm>
         </p:spPr>
         <p:txBody>
@@ -1539,8 +1544,8 @@
         </p:nvSpPr>
         <p:spPr>
           <a:xfrm>
-            <a:off x="5207794" y="3256598"/>
-            <a:ext cx="4373315" cy="4789964"/>
+            <a:off x="5207794" y="3089593"/>
+            <a:ext cx="4373315" cy="4544325"/>
           </a:xfrm>
         </p:spPr>
         <p:txBody>
@@ -1601,7 +1606,7 @@
           <a:p>
             <a:fld id="{DD4E2C3F-D803-BA45-B4A9-CD3B679F1D1E}" type="datetimeFigureOut">
               <a:rPr lang="en-US" smtClean="0"/>
-              <a:t>8/13/21</a:t>
+              <a:t>8/14/21</a:t>
             </a:fld>
             <a:endParaRPr lang="en-US"/>
           </a:p>
@@ -1652,7 +1657,7 @@
     </p:spTree>
     <p:extLst>
       <p:ext uri="{BB962C8B-B14F-4D97-AF65-F5344CB8AC3E}">
-        <p14:creationId xmlns:p14="http://schemas.microsoft.com/office/powerpoint/2010/main" val="356786048"/>
+        <p14:creationId xmlns:p14="http://schemas.microsoft.com/office/powerpoint/2010/main" val="61043856"/>
       </p:ext>
     </p:extLst>
   </p:cSld>
@@ -1719,7 +1724,7 @@
           <a:p>
             <a:fld id="{DD4E2C3F-D803-BA45-B4A9-CD3B679F1D1E}" type="datetimeFigureOut">
               <a:rPr lang="en-US" smtClean="0"/>
-              <a:t>8/13/21</a:t>
+              <a:t>8/14/21</a:t>
             </a:fld>
             <a:endParaRPr lang="en-US"/>
           </a:p>
@@ -1770,7 +1775,7 @@
     </p:spTree>
     <p:extLst>
       <p:ext uri="{BB962C8B-B14F-4D97-AF65-F5344CB8AC3E}">
-        <p14:creationId xmlns:p14="http://schemas.microsoft.com/office/powerpoint/2010/main" val="70234293"/>
+        <p14:creationId xmlns:p14="http://schemas.microsoft.com/office/powerpoint/2010/main" val="1900447868"/>
       </p:ext>
     </p:extLst>
   </p:cSld>
@@ -1814,7 +1819,7 @@
           <a:p>
             <a:fld id="{DD4E2C3F-D803-BA45-B4A9-CD3B679F1D1E}" type="datetimeFigureOut">
               <a:rPr lang="en-US" smtClean="0"/>
-              <a:t>8/13/21</a:t>
+              <a:t>8/14/21</a:t>
             </a:fld>
             <a:endParaRPr lang="en-US"/>
           </a:p>
@@ -1865,7 +1870,7 @@
     </p:spTree>
     <p:extLst>
       <p:ext uri="{BB962C8B-B14F-4D97-AF65-F5344CB8AC3E}">
-        <p14:creationId xmlns:p14="http://schemas.microsoft.com/office/powerpoint/2010/main" val="1586694846"/>
+        <p14:creationId xmlns:p14="http://schemas.microsoft.com/office/powerpoint/2010/main" val="879061060"/>
       </p:ext>
     </p:extLst>
   </p:cSld>
@@ -1904,8 +1909,8 @@
         </p:nvSpPr>
         <p:spPr>
           <a:xfrm>
-            <a:off x="708571" y="594360"/>
-            <a:ext cx="3317825" cy="2080260"/>
+            <a:off x="708571" y="563880"/>
+            <a:ext cx="3317825" cy="1973580"/>
           </a:xfrm>
         </p:spPr>
         <p:txBody>
@@ -1936,8 +1941,8 @@
         </p:nvSpPr>
         <p:spPr>
           <a:xfrm>
-            <a:off x="4373315" y="1283654"/>
-            <a:ext cx="5207794" cy="6335713"/>
+            <a:off x="4373315" y="1217826"/>
+            <a:ext cx="5207794" cy="6010804"/>
           </a:xfrm>
         </p:spPr>
         <p:txBody>
@@ -2021,8 +2026,8 @@
         </p:nvSpPr>
         <p:spPr>
           <a:xfrm>
-            <a:off x="708571" y="2674620"/>
-            <a:ext cx="3317825" cy="4955064"/>
+            <a:off x="708571" y="2537460"/>
+            <a:ext cx="3317825" cy="4700959"/>
           </a:xfrm>
         </p:spPr>
         <p:txBody>
@@ -2091,7 +2096,7 @@
           <a:p>
             <a:fld id="{DD4E2C3F-D803-BA45-B4A9-CD3B679F1D1E}" type="datetimeFigureOut">
               <a:rPr lang="en-US" smtClean="0"/>
-              <a:t>8/13/21</a:t>
+              <a:t>8/14/21</a:t>
             </a:fld>
             <a:endParaRPr lang="en-US"/>
           </a:p>
@@ -2142,7 +2147,7 @@
     </p:spTree>
     <p:extLst>
       <p:ext uri="{BB962C8B-B14F-4D97-AF65-F5344CB8AC3E}">
-        <p14:creationId xmlns:p14="http://schemas.microsoft.com/office/powerpoint/2010/main" val="1312455315"/>
+        <p14:creationId xmlns:p14="http://schemas.microsoft.com/office/powerpoint/2010/main" val="3689851933"/>
       </p:ext>
     </p:extLst>
   </p:cSld>
@@ -2181,8 +2186,8 @@
         </p:nvSpPr>
         <p:spPr>
           <a:xfrm>
-            <a:off x="708571" y="594360"/>
-            <a:ext cx="3317825" cy="2080260"/>
+            <a:off x="708571" y="563880"/>
+            <a:ext cx="3317825" cy="1973580"/>
           </a:xfrm>
         </p:spPr>
         <p:txBody>
@@ -2213,8 +2218,8 @@
         </p:nvSpPr>
         <p:spPr>
           <a:xfrm>
-            <a:off x="4373315" y="1283654"/>
-            <a:ext cx="5207794" cy="6335713"/>
+            <a:off x="4373315" y="1217826"/>
+            <a:ext cx="5207794" cy="6010804"/>
           </a:xfrm>
         </p:spPr>
         <p:txBody>
@@ -2278,8 +2283,8 @@
         </p:nvSpPr>
         <p:spPr>
           <a:xfrm>
-            <a:off x="708571" y="2674620"/>
-            <a:ext cx="3317825" cy="4955064"/>
+            <a:off x="708571" y="2537460"/>
+            <a:ext cx="3317825" cy="4700959"/>
           </a:xfrm>
         </p:spPr>
         <p:txBody>
@@ -2348,7 +2353,7 @@
           <a:p>
             <a:fld id="{DD4E2C3F-D803-BA45-B4A9-CD3B679F1D1E}" type="datetimeFigureOut">
               <a:rPr lang="en-US" smtClean="0"/>
-              <a:t>8/13/21</a:t>
+              <a:t>8/14/21</a:t>
             </a:fld>
             <a:endParaRPr lang="en-US"/>
           </a:p>
@@ -2399,7 +2404,7 @@
     </p:spTree>
     <p:extLst>
       <p:ext uri="{BB962C8B-B14F-4D97-AF65-F5344CB8AC3E}">
-        <p14:creationId xmlns:p14="http://schemas.microsoft.com/office/powerpoint/2010/main" val="748347161"/>
+        <p14:creationId xmlns:p14="http://schemas.microsoft.com/office/powerpoint/2010/main" val="1039743754"/>
       </p:ext>
     </p:extLst>
   </p:cSld>
@@ -2443,8 +2448,8 @@
         </p:nvSpPr>
         <p:spPr>
           <a:xfrm>
-            <a:off x="707231" y="474664"/>
-            <a:ext cx="8872538" cy="1723232"/>
+            <a:off x="707231" y="450323"/>
+            <a:ext cx="8872538" cy="1634861"/>
           </a:xfrm>
           <a:prstGeom prst="rect">
             <a:avLst/>
@@ -2476,8 +2481,8 @@
         </p:nvSpPr>
         <p:spPr>
           <a:xfrm>
-            <a:off x="707231" y="2373313"/>
-            <a:ext cx="8872538" cy="5656739"/>
+            <a:off x="707231" y="2251604"/>
+            <a:ext cx="8872538" cy="5366650"/>
           </a:xfrm>
           <a:prstGeom prst="rect">
             <a:avLst/>
@@ -2538,8 +2543,8 @@
         </p:nvSpPr>
         <p:spPr>
           <a:xfrm>
-            <a:off x="707231" y="8263257"/>
-            <a:ext cx="2314575" cy="474663"/>
+            <a:off x="707231" y="7839500"/>
+            <a:ext cx="2314575" cy="450321"/>
           </a:xfrm>
           <a:prstGeom prst="rect">
             <a:avLst/>
@@ -2561,7 +2566,7 @@
           <a:p>
             <a:fld id="{DD4E2C3F-D803-BA45-B4A9-CD3B679F1D1E}" type="datetimeFigureOut">
               <a:rPr lang="en-US" smtClean="0"/>
-              <a:t>8/13/21</a:t>
+              <a:t>8/14/21</a:t>
             </a:fld>
             <a:endParaRPr lang="en-US"/>
           </a:p>
@@ -2579,8 +2584,8 @@
         </p:nvSpPr>
         <p:spPr>
           <a:xfrm>
-            <a:off x="3407569" y="8263257"/>
-            <a:ext cx="3471863" cy="474663"/>
+            <a:off x="3407569" y="7839500"/>
+            <a:ext cx="3471863" cy="450321"/>
           </a:xfrm>
           <a:prstGeom prst="rect">
             <a:avLst/>
@@ -2616,8 +2621,8 @@
         </p:nvSpPr>
         <p:spPr>
           <a:xfrm>
-            <a:off x="7265194" y="8263257"/>
-            <a:ext cx="2314575" cy="474663"/>
+            <a:off x="7265194" y="7839500"/>
+            <a:ext cx="2314575" cy="450321"/>
           </a:xfrm>
           <a:prstGeom prst="rect">
             <a:avLst/>
@@ -2648,23 +2653,23 @@
     </p:spTree>
     <p:extLst>
       <p:ext uri="{BB962C8B-B14F-4D97-AF65-F5344CB8AC3E}">
-        <p14:creationId xmlns:p14="http://schemas.microsoft.com/office/powerpoint/2010/main" val="3543329429"/>
+        <p14:creationId xmlns:p14="http://schemas.microsoft.com/office/powerpoint/2010/main" val="547484713"/>
       </p:ext>
     </p:extLst>
   </p:cSld>
   <p:clrMap bg1="lt1" tx1="dk1" bg2="lt2" tx2="dk2" accent1="accent1" accent2="accent2" accent3="accent3" accent4="accent4" accent5="accent5" accent6="accent6" hlink="hlink" folHlink="folHlink"/>
   <p:sldLayoutIdLst>
-    <p:sldLayoutId id="2147483721" r:id="rId1"/>
-    <p:sldLayoutId id="2147483722" r:id="rId2"/>
-    <p:sldLayoutId id="2147483723" r:id="rId3"/>
-    <p:sldLayoutId id="2147483724" r:id="rId4"/>
-    <p:sldLayoutId id="2147483725" r:id="rId5"/>
-    <p:sldLayoutId id="2147483726" r:id="rId6"/>
-    <p:sldLayoutId id="2147483727" r:id="rId7"/>
-    <p:sldLayoutId id="2147483728" r:id="rId8"/>
-    <p:sldLayoutId id="2147483729" r:id="rId9"/>
-    <p:sldLayoutId id="2147483730" r:id="rId10"/>
-    <p:sldLayoutId id="2147483731" r:id="rId11"/>
+    <p:sldLayoutId id="2147483757" r:id="rId1"/>
+    <p:sldLayoutId id="2147483758" r:id="rId2"/>
+    <p:sldLayoutId id="2147483759" r:id="rId3"/>
+    <p:sldLayoutId id="2147483760" r:id="rId4"/>
+    <p:sldLayoutId id="2147483761" r:id="rId5"/>
+    <p:sldLayoutId id="2147483762" r:id="rId6"/>
+    <p:sldLayoutId id="2147483763" r:id="rId7"/>
+    <p:sldLayoutId id="2147483764" r:id="rId8"/>
+    <p:sldLayoutId id="2147483765" r:id="rId9"/>
+    <p:sldLayoutId id="2147483766" r:id="rId10"/>
+    <p:sldLayoutId id="2147483767" r:id="rId11"/>
   </p:sldLayoutIdLst>
   <p:txStyles>
     <p:titleStyle>
@@ -2988,7 +2993,7 @@
         </p:blipFill>
         <p:spPr>
           <a:xfrm>
-            <a:off x="25400" y="0"/>
+            <a:off x="25400" y="25467"/>
             <a:ext cx="10139912" cy="6858000"/>
           </a:xfrm>
           <a:prstGeom prst="rect">
@@ -2998,10 +3003,10 @@
       </p:pic>
       <p:pic>
         <p:nvPicPr>
-          <p:cNvPr id="25" name="Picture 24">
+          <p:cNvPr id="3" name="Picture 2">
             <a:extLst>
               <a:ext uri="{FF2B5EF4-FFF2-40B4-BE49-F238E27FC236}">
-                <a16:creationId xmlns:a16="http://schemas.microsoft.com/office/drawing/2014/main" id="{B5D4B4A7-8533-C140-856F-A2783B08B469}"/>
+                <a16:creationId xmlns:a16="http://schemas.microsoft.com/office/drawing/2014/main" id="{6B7764F7-FA81-7948-9A29-8E5F644A5EAC}"/>
               </a:ext>
             </a:extLst>
           </p:cNvPr>
@@ -3018,8 +3023,8 @@
         </p:blipFill>
         <p:spPr>
           <a:xfrm>
-            <a:off x="0" y="6832600"/>
-            <a:ext cx="9817100" cy="1930400"/>
+            <a:off x="0" y="6680265"/>
+            <a:ext cx="9817100" cy="1739900"/>
           </a:xfrm>
           <a:prstGeom prst="rect">
             <a:avLst/>
@@ -3047,7 +3052,7 @@
         </p:blipFill>
         <p:spPr>
           <a:xfrm>
-            <a:off x="8989227" y="8561744"/>
+            <a:off x="8989228" y="8218909"/>
             <a:ext cx="1176085" cy="201256"/>
           </a:xfrm>
           <a:prstGeom prst="rect">

</xml_diff>

<commit_message>
fix elif/if error in mutation counting. update Fig1 and Fig2 accordingly
</commit_message>
<xml_diff>
--- a/analysis/plots/fig1.pptx
+++ b/analysis/plots/fig1.pptx
@@ -243,7 +243,7 @@
           <a:p>
             <a:fld id="{DD4E2C3F-D803-BA45-B4A9-CD3B679F1D1E}" type="datetimeFigureOut">
               <a:rPr lang="en-US" smtClean="0"/>
-              <a:t>8/14/21</a:t>
+              <a:t>8/17/21</a:t>
             </a:fld>
             <a:endParaRPr lang="en-US"/>
           </a:p>
@@ -413,7 +413,7 @@
           <a:p>
             <a:fld id="{DD4E2C3F-D803-BA45-B4A9-CD3B679F1D1E}" type="datetimeFigureOut">
               <a:rPr lang="en-US" smtClean="0"/>
-              <a:t>8/14/21</a:t>
+              <a:t>8/17/21</a:t>
             </a:fld>
             <a:endParaRPr lang="en-US"/>
           </a:p>
@@ -593,7 +593,7 @@
           <a:p>
             <a:fld id="{DD4E2C3F-D803-BA45-B4A9-CD3B679F1D1E}" type="datetimeFigureOut">
               <a:rPr lang="en-US" smtClean="0"/>
-              <a:t>8/14/21</a:t>
+              <a:t>8/17/21</a:t>
             </a:fld>
             <a:endParaRPr lang="en-US"/>
           </a:p>
@@ -763,7 +763,7 @@
           <a:p>
             <a:fld id="{DD4E2C3F-D803-BA45-B4A9-CD3B679F1D1E}" type="datetimeFigureOut">
               <a:rPr lang="en-US" smtClean="0"/>
-              <a:t>8/14/21</a:t>
+              <a:t>8/17/21</a:t>
             </a:fld>
             <a:endParaRPr lang="en-US"/>
           </a:p>
@@ -1007,7 +1007,7 @@
           <a:p>
             <a:fld id="{DD4E2C3F-D803-BA45-B4A9-CD3B679F1D1E}" type="datetimeFigureOut">
               <a:rPr lang="en-US" smtClean="0"/>
-              <a:t>8/14/21</a:t>
+              <a:t>8/17/21</a:t>
             </a:fld>
             <a:endParaRPr lang="en-US"/>
           </a:p>
@@ -1239,7 +1239,7 @@
           <a:p>
             <a:fld id="{DD4E2C3F-D803-BA45-B4A9-CD3B679F1D1E}" type="datetimeFigureOut">
               <a:rPr lang="en-US" smtClean="0"/>
-              <a:t>8/14/21</a:t>
+              <a:t>8/17/21</a:t>
             </a:fld>
             <a:endParaRPr lang="en-US"/>
           </a:p>
@@ -1606,7 +1606,7 @@
           <a:p>
             <a:fld id="{DD4E2C3F-D803-BA45-B4A9-CD3B679F1D1E}" type="datetimeFigureOut">
               <a:rPr lang="en-US" smtClean="0"/>
-              <a:t>8/14/21</a:t>
+              <a:t>8/17/21</a:t>
             </a:fld>
             <a:endParaRPr lang="en-US"/>
           </a:p>
@@ -1724,7 +1724,7 @@
           <a:p>
             <a:fld id="{DD4E2C3F-D803-BA45-B4A9-CD3B679F1D1E}" type="datetimeFigureOut">
               <a:rPr lang="en-US" smtClean="0"/>
-              <a:t>8/14/21</a:t>
+              <a:t>8/17/21</a:t>
             </a:fld>
             <a:endParaRPr lang="en-US"/>
           </a:p>
@@ -1819,7 +1819,7 @@
           <a:p>
             <a:fld id="{DD4E2C3F-D803-BA45-B4A9-CD3B679F1D1E}" type="datetimeFigureOut">
               <a:rPr lang="en-US" smtClean="0"/>
-              <a:t>8/14/21</a:t>
+              <a:t>8/17/21</a:t>
             </a:fld>
             <a:endParaRPr lang="en-US"/>
           </a:p>
@@ -2096,7 +2096,7 @@
           <a:p>
             <a:fld id="{DD4E2C3F-D803-BA45-B4A9-CD3B679F1D1E}" type="datetimeFigureOut">
               <a:rPr lang="en-US" smtClean="0"/>
-              <a:t>8/14/21</a:t>
+              <a:t>8/17/21</a:t>
             </a:fld>
             <a:endParaRPr lang="en-US"/>
           </a:p>
@@ -2353,7 +2353,7 @@
           <a:p>
             <a:fld id="{DD4E2C3F-D803-BA45-B4A9-CD3B679F1D1E}" type="datetimeFigureOut">
               <a:rPr lang="en-US" smtClean="0"/>
-              <a:t>8/14/21</a:t>
+              <a:t>8/17/21</a:t>
             </a:fld>
             <a:endParaRPr lang="en-US"/>
           </a:p>
@@ -2566,7 +2566,7 @@
           <a:p>
             <a:fld id="{DD4E2C3F-D803-BA45-B4A9-CD3B679F1D1E}" type="datetimeFigureOut">
               <a:rPr lang="en-US" smtClean="0"/>
-              <a:t>8/14/21</a:t>
+              <a:t>8/17/21</a:t>
             </a:fld>
             <a:endParaRPr lang="en-US"/>
           </a:p>
@@ -2973,10 +2973,10 @@
       </p:grpSpPr>
       <p:pic>
         <p:nvPicPr>
-          <p:cNvPr id="11" name="Picture 10">
+          <p:cNvPr id="4" name="Picture 3">
             <a:extLst>
               <a:ext uri="{FF2B5EF4-FFF2-40B4-BE49-F238E27FC236}">
-                <a16:creationId xmlns:a16="http://schemas.microsoft.com/office/drawing/2014/main" id="{1828A4BF-CF68-6547-8F94-562ABEE5FA72}"/>
+                <a16:creationId xmlns:a16="http://schemas.microsoft.com/office/drawing/2014/main" id="{6E651191-8483-A443-86D7-A812B2195750}"/>
               </a:ext>
             </a:extLst>
           </p:cNvPr>
@@ -2993,8 +2993,8 @@
         </p:blipFill>
         <p:spPr>
           <a:xfrm>
-            <a:off x="25400" y="25467"/>
-            <a:ext cx="10139912" cy="6858000"/>
+            <a:off x="0" y="-26129"/>
+            <a:ext cx="10287000" cy="6957481"/>
           </a:xfrm>
           <a:prstGeom prst="rect">
             <a:avLst/>
@@ -3003,10 +3003,10 @@
       </p:pic>
       <p:pic>
         <p:nvPicPr>
-          <p:cNvPr id="3" name="Picture 2">
+          <p:cNvPr id="17" name="Picture 16">
             <a:extLst>
               <a:ext uri="{FF2B5EF4-FFF2-40B4-BE49-F238E27FC236}">
-                <a16:creationId xmlns:a16="http://schemas.microsoft.com/office/drawing/2014/main" id="{6B7764F7-FA81-7948-9A29-8E5F644A5EAC}"/>
+                <a16:creationId xmlns:a16="http://schemas.microsoft.com/office/drawing/2014/main" id="{194375AE-69A4-4F43-A588-F4AE9ACC36D7}"/>
               </a:ext>
             </a:extLst>
           </p:cNvPr>
@@ -3023,8 +3023,8 @@
         </p:blipFill>
         <p:spPr>
           <a:xfrm>
-            <a:off x="0" y="6680265"/>
-            <a:ext cx="9817100" cy="1739900"/>
+            <a:off x="0" y="6900440"/>
+            <a:ext cx="10287000" cy="1552975"/>
           </a:xfrm>
           <a:prstGeom prst="rect">
             <a:avLst/>
@@ -3052,7 +3052,7 @@
         </p:blipFill>
         <p:spPr>
           <a:xfrm>
-            <a:off x="8989228" y="8218909"/>
+            <a:off x="9039103" y="8218909"/>
             <a:ext cx="1176085" cy="201256"/>
           </a:xfrm>
           <a:prstGeom prst="rect">

</xml_diff>

<commit_message>
document and organize code
</commit_message>
<xml_diff>
--- a/analysis/plots/fig1.pptx
+++ b/analysis/plots/fig1.pptx
@@ -2,12 +2,12 @@
 <file path=ppt/presentation.xml><?xml version="1.0" encoding="utf-8"?>
 <p:presentation xmlns:a="http://schemas.openxmlformats.org/drawingml/2006/main" xmlns:r="http://schemas.openxmlformats.org/officeDocument/2006/relationships" xmlns:p="http://schemas.openxmlformats.org/presentationml/2006/main" saveSubsetFonts="1" autoCompressPictures="0">
   <p:sldMasterIdLst>
-    <p:sldMasterId id="2147483756" r:id="rId1"/>
+    <p:sldMasterId id="2147483768" r:id="rId1"/>
   </p:sldMasterIdLst>
   <p:sldIdLst>
     <p:sldId id="256" r:id="rId2"/>
   </p:sldIdLst>
-  <p:sldSz cx="10287000" cy="8458200"/>
+  <p:sldSz cx="10287000" cy="8229600"/>
   <p:notesSz cx="6858000" cy="9144000"/>
   <p:defaultTextStyle>
     <a:defPPr>
@@ -141,8 +141,8 @@
         </p:nvSpPr>
         <p:spPr>
           <a:xfrm>
-            <a:off x="771525" y="1384248"/>
-            <a:ext cx="8743950" cy="2944707"/>
+            <a:off x="771525" y="1346836"/>
+            <a:ext cx="8743950" cy="2865120"/>
           </a:xfrm>
         </p:spPr>
         <p:txBody>
@@ -173,8 +173,8 @@
         </p:nvSpPr>
         <p:spPr>
           <a:xfrm>
-            <a:off x="1285875" y="4442514"/>
-            <a:ext cx="7715250" cy="2042106"/>
+            <a:off x="1285875" y="4322446"/>
+            <a:ext cx="7715250" cy="1986914"/>
           </a:xfrm>
         </p:spPr>
         <p:txBody>
@@ -243,7 +243,7 @@
           <a:p>
             <a:fld id="{DD4E2C3F-D803-BA45-B4A9-CD3B679F1D1E}" type="datetimeFigureOut">
               <a:rPr lang="en-US" smtClean="0"/>
-              <a:t>8/17/21</a:t>
+              <a:t>8/18/21</a:t>
             </a:fld>
             <a:endParaRPr lang="en-US"/>
           </a:p>
@@ -294,7 +294,7 @@
     </p:spTree>
     <p:extLst>
       <p:ext uri="{BB962C8B-B14F-4D97-AF65-F5344CB8AC3E}">
-        <p14:creationId xmlns:p14="http://schemas.microsoft.com/office/powerpoint/2010/main" val="1634223402"/>
+        <p14:creationId xmlns:p14="http://schemas.microsoft.com/office/powerpoint/2010/main" val="1183168863"/>
       </p:ext>
     </p:extLst>
   </p:cSld>
@@ -413,7 +413,7 @@
           <a:p>
             <a:fld id="{DD4E2C3F-D803-BA45-B4A9-CD3B679F1D1E}" type="datetimeFigureOut">
               <a:rPr lang="en-US" smtClean="0"/>
-              <a:t>8/17/21</a:t>
+              <a:t>8/18/21</a:t>
             </a:fld>
             <a:endParaRPr lang="en-US"/>
           </a:p>
@@ -464,7 +464,7 @@
     </p:spTree>
     <p:extLst>
       <p:ext uri="{BB962C8B-B14F-4D97-AF65-F5344CB8AC3E}">
-        <p14:creationId xmlns:p14="http://schemas.microsoft.com/office/powerpoint/2010/main" val="1477418759"/>
+        <p14:creationId xmlns:p14="http://schemas.microsoft.com/office/powerpoint/2010/main" val="1662387020"/>
       </p:ext>
     </p:extLst>
   </p:cSld>
@@ -503,8 +503,8 @@
         </p:nvSpPr>
         <p:spPr>
           <a:xfrm>
-            <a:off x="7361635" y="450321"/>
-            <a:ext cx="2218134" cy="7167934"/>
+            <a:off x="7361635" y="438150"/>
+            <a:ext cx="2218134" cy="6974206"/>
           </a:xfrm>
         </p:spPr>
         <p:txBody>
@@ -531,8 +531,8 @@
         </p:nvSpPr>
         <p:spPr>
           <a:xfrm>
-            <a:off x="707232" y="450321"/>
-            <a:ext cx="6525816" cy="7167934"/>
+            <a:off x="707232" y="438150"/>
+            <a:ext cx="6525816" cy="6974206"/>
           </a:xfrm>
         </p:spPr>
         <p:txBody>
@@ -593,7 +593,7 @@
           <a:p>
             <a:fld id="{DD4E2C3F-D803-BA45-B4A9-CD3B679F1D1E}" type="datetimeFigureOut">
               <a:rPr lang="en-US" smtClean="0"/>
-              <a:t>8/17/21</a:t>
+              <a:t>8/18/21</a:t>
             </a:fld>
             <a:endParaRPr lang="en-US"/>
           </a:p>
@@ -644,7 +644,7 @@
     </p:spTree>
     <p:extLst>
       <p:ext uri="{BB962C8B-B14F-4D97-AF65-F5344CB8AC3E}">
-        <p14:creationId xmlns:p14="http://schemas.microsoft.com/office/powerpoint/2010/main" val="89031656"/>
+        <p14:creationId xmlns:p14="http://schemas.microsoft.com/office/powerpoint/2010/main" val="3086899159"/>
       </p:ext>
     </p:extLst>
   </p:cSld>
@@ -763,7 +763,7 @@
           <a:p>
             <a:fld id="{DD4E2C3F-D803-BA45-B4A9-CD3B679F1D1E}" type="datetimeFigureOut">
               <a:rPr lang="en-US" smtClean="0"/>
-              <a:t>8/17/21</a:t>
+              <a:t>8/18/21</a:t>
             </a:fld>
             <a:endParaRPr lang="en-US"/>
           </a:p>
@@ -814,7 +814,7 @@
     </p:spTree>
     <p:extLst>
       <p:ext uri="{BB962C8B-B14F-4D97-AF65-F5344CB8AC3E}">
-        <p14:creationId xmlns:p14="http://schemas.microsoft.com/office/powerpoint/2010/main" val="528713893"/>
+        <p14:creationId xmlns:p14="http://schemas.microsoft.com/office/powerpoint/2010/main" val="4260264779"/>
       </p:ext>
     </p:extLst>
   </p:cSld>
@@ -853,8 +853,8 @@
         </p:nvSpPr>
         <p:spPr>
           <a:xfrm>
-            <a:off x="701874" y="2108679"/>
-            <a:ext cx="8872538" cy="3518376"/>
+            <a:off x="701874" y="2051688"/>
+            <a:ext cx="8872538" cy="3423284"/>
           </a:xfrm>
         </p:spPr>
         <p:txBody>
@@ -885,8 +885,8 @@
         </p:nvSpPr>
         <p:spPr>
           <a:xfrm>
-            <a:off x="701874" y="5660339"/>
-            <a:ext cx="8872538" cy="1850231"/>
+            <a:off x="701874" y="5507358"/>
+            <a:ext cx="8872538" cy="1800224"/>
           </a:xfrm>
         </p:spPr>
         <p:txBody>
@@ -1007,7 +1007,7 @@
           <a:p>
             <a:fld id="{DD4E2C3F-D803-BA45-B4A9-CD3B679F1D1E}" type="datetimeFigureOut">
               <a:rPr lang="en-US" smtClean="0"/>
-              <a:t>8/17/21</a:t>
+              <a:t>8/18/21</a:t>
             </a:fld>
             <a:endParaRPr lang="en-US"/>
           </a:p>
@@ -1058,7 +1058,7 @@
     </p:spTree>
     <p:extLst>
       <p:ext uri="{BB962C8B-B14F-4D97-AF65-F5344CB8AC3E}">
-        <p14:creationId xmlns:p14="http://schemas.microsoft.com/office/powerpoint/2010/main" val="1317664164"/>
+        <p14:creationId xmlns:p14="http://schemas.microsoft.com/office/powerpoint/2010/main" val="2813157200"/>
       </p:ext>
     </p:extLst>
   </p:cSld>
@@ -1120,8 +1120,8 @@
         </p:nvSpPr>
         <p:spPr>
           <a:xfrm>
-            <a:off x="707231" y="2251604"/>
-            <a:ext cx="4371975" cy="5366650"/>
+            <a:off x="707231" y="2190750"/>
+            <a:ext cx="4371975" cy="5221606"/>
           </a:xfrm>
         </p:spPr>
         <p:txBody>
@@ -1177,8 +1177,8 @@
         </p:nvSpPr>
         <p:spPr>
           <a:xfrm>
-            <a:off x="5207794" y="2251604"/>
-            <a:ext cx="4371975" cy="5366650"/>
+            <a:off x="5207794" y="2190750"/>
+            <a:ext cx="4371975" cy="5221606"/>
           </a:xfrm>
         </p:spPr>
         <p:txBody>
@@ -1239,7 +1239,7 @@
           <a:p>
             <a:fld id="{DD4E2C3F-D803-BA45-B4A9-CD3B679F1D1E}" type="datetimeFigureOut">
               <a:rPr lang="en-US" smtClean="0"/>
-              <a:t>8/17/21</a:t>
+              <a:t>8/18/21</a:t>
             </a:fld>
             <a:endParaRPr lang="en-US"/>
           </a:p>
@@ -1290,7 +1290,7 @@
     </p:spTree>
     <p:extLst>
       <p:ext uri="{BB962C8B-B14F-4D97-AF65-F5344CB8AC3E}">
-        <p14:creationId xmlns:p14="http://schemas.microsoft.com/office/powerpoint/2010/main" val="3869668433"/>
+        <p14:creationId xmlns:p14="http://schemas.microsoft.com/office/powerpoint/2010/main" val="3743844011"/>
       </p:ext>
     </p:extLst>
   </p:cSld>
@@ -1329,8 +1329,8 @@
         </p:nvSpPr>
         <p:spPr>
           <a:xfrm>
-            <a:off x="708571" y="450323"/>
-            <a:ext cx="8872538" cy="1634861"/>
+            <a:off x="708571" y="438152"/>
+            <a:ext cx="8872538" cy="1590676"/>
           </a:xfrm>
         </p:spPr>
         <p:txBody>
@@ -1357,8 +1357,8 @@
         </p:nvSpPr>
         <p:spPr>
           <a:xfrm>
-            <a:off x="708572" y="2073434"/>
-            <a:ext cx="4351883" cy="1016158"/>
+            <a:off x="708572" y="2017396"/>
+            <a:ext cx="4351883" cy="988694"/>
           </a:xfrm>
         </p:spPr>
         <p:txBody>
@@ -1422,8 +1422,8 @@
         </p:nvSpPr>
         <p:spPr>
           <a:xfrm>
-            <a:off x="708572" y="3089593"/>
-            <a:ext cx="4351883" cy="4544325"/>
+            <a:off x="708572" y="3006090"/>
+            <a:ext cx="4351883" cy="4421506"/>
           </a:xfrm>
         </p:spPr>
         <p:txBody>
@@ -1479,8 +1479,8 @@
         </p:nvSpPr>
         <p:spPr>
           <a:xfrm>
-            <a:off x="5207794" y="2073434"/>
-            <a:ext cx="4373315" cy="1016158"/>
+            <a:off x="5207794" y="2017396"/>
+            <a:ext cx="4373315" cy="988694"/>
           </a:xfrm>
         </p:spPr>
         <p:txBody>
@@ -1544,8 +1544,8 @@
         </p:nvSpPr>
         <p:spPr>
           <a:xfrm>
-            <a:off x="5207794" y="3089593"/>
-            <a:ext cx="4373315" cy="4544325"/>
+            <a:off x="5207794" y="3006090"/>
+            <a:ext cx="4373315" cy="4421506"/>
           </a:xfrm>
         </p:spPr>
         <p:txBody>
@@ -1606,7 +1606,7 @@
           <a:p>
             <a:fld id="{DD4E2C3F-D803-BA45-B4A9-CD3B679F1D1E}" type="datetimeFigureOut">
               <a:rPr lang="en-US" smtClean="0"/>
-              <a:t>8/17/21</a:t>
+              <a:t>8/18/21</a:t>
             </a:fld>
             <a:endParaRPr lang="en-US"/>
           </a:p>
@@ -1657,7 +1657,7 @@
     </p:spTree>
     <p:extLst>
       <p:ext uri="{BB962C8B-B14F-4D97-AF65-F5344CB8AC3E}">
-        <p14:creationId xmlns:p14="http://schemas.microsoft.com/office/powerpoint/2010/main" val="61043856"/>
+        <p14:creationId xmlns:p14="http://schemas.microsoft.com/office/powerpoint/2010/main" val="1276628017"/>
       </p:ext>
     </p:extLst>
   </p:cSld>
@@ -1724,7 +1724,7 @@
           <a:p>
             <a:fld id="{DD4E2C3F-D803-BA45-B4A9-CD3B679F1D1E}" type="datetimeFigureOut">
               <a:rPr lang="en-US" smtClean="0"/>
-              <a:t>8/17/21</a:t>
+              <a:t>8/18/21</a:t>
             </a:fld>
             <a:endParaRPr lang="en-US"/>
           </a:p>
@@ -1775,7 +1775,7 @@
     </p:spTree>
     <p:extLst>
       <p:ext uri="{BB962C8B-B14F-4D97-AF65-F5344CB8AC3E}">
-        <p14:creationId xmlns:p14="http://schemas.microsoft.com/office/powerpoint/2010/main" val="1900447868"/>
+        <p14:creationId xmlns:p14="http://schemas.microsoft.com/office/powerpoint/2010/main" val="1586953895"/>
       </p:ext>
     </p:extLst>
   </p:cSld>
@@ -1819,7 +1819,7 @@
           <a:p>
             <a:fld id="{DD4E2C3F-D803-BA45-B4A9-CD3B679F1D1E}" type="datetimeFigureOut">
               <a:rPr lang="en-US" smtClean="0"/>
-              <a:t>8/17/21</a:t>
+              <a:t>8/18/21</a:t>
             </a:fld>
             <a:endParaRPr lang="en-US"/>
           </a:p>
@@ -1870,7 +1870,7 @@
     </p:spTree>
     <p:extLst>
       <p:ext uri="{BB962C8B-B14F-4D97-AF65-F5344CB8AC3E}">
-        <p14:creationId xmlns:p14="http://schemas.microsoft.com/office/powerpoint/2010/main" val="879061060"/>
+        <p14:creationId xmlns:p14="http://schemas.microsoft.com/office/powerpoint/2010/main" val="1476633705"/>
       </p:ext>
     </p:extLst>
   </p:cSld>
@@ -1909,8 +1909,8 @@
         </p:nvSpPr>
         <p:spPr>
           <a:xfrm>
-            <a:off x="708571" y="563880"/>
-            <a:ext cx="3317825" cy="1973580"/>
+            <a:off x="708571" y="548640"/>
+            <a:ext cx="3317825" cy="1920240"/>
           </a:xfrm>
         </p:spPr>
         <p:txBody>
@@ -1941,8 +1941,8 @@
         </p:nvSpPr>
         <p:spPr>
           <a:xfrm>
-            <a:off x="4373315" y="1217826"/>
-            <a:ext cx="5207794" cy="6010804"/>
+            <a:off x="4373315" y="1184912"/>
+            <a:ext cx="5207794" cy="5848350"/>
           </a:xfrm>
         </p:spPr>
         <p:txBody>
@@ -2026,8 +2026,8 @@
         </p:nvSpPr>
         <p:spPr>
           <a:xfrm>
-            <a:off x="708571" y="2537460"/>
-            <a:ext cx="3317825" cy="4700959"/>
+            <a:off x="708571" y="2468880"/>
+            <a:ext cx="3317825" cy="4573906"/>
           </a:xfrm>
         </p:spPr>
         <p:txBody>
@@ -2096,7 +2096,7 @@
           <a:p>
             <a:fld id="{DD4E2C3F-D803-BA45-B4A9-CD3B679F1D1E}" type="datetimeFigureOut">
               <a:rPr lang="en-US" smtClean="0"/>
-              <a:t>8/17/21</a:t>
+              <a:t>8/18/21</a:t>
             </a:fld>
             <a:endParaRPr lang="en-US"/>
           </a:p>
@@ -2147,7 +2147,7 @@
     </p:spTree>
     <p:extLst>
       <p:ext uri="{BB962C8B-B14F-4D97-AF65-F5344CB8AC3E}">
-        <p14:creationId xmlns:p14="http://schemas.microsoft.com/office/powerpoint/2010/main" val="3689851933"/>
+        <p14:creationId xmlns:p14="http://schemas.microsoft.com/office/powerpoint/2010/main" val="1433891487"/>
       </p:ext>
     </p:extLst>
   </p:cSld>
@@ -2186,8 +2186,8 @@
         </p:nvSpPr>
         <p:spPr>
           <a:xfrm>
-            <a:off x="708571" y="563880"/>
-            <a:ext cx="3317825" cy="1973580"/>
+            <a:off x="708571" y="548640"/>
+            <a:ext cx="3317825" cy="1920240"/>
           </a:xfrm>
         </p:spPr>
         <p:txBody>
@@ -2218,8 +2218,8 @@
         </p:nvSpPr>
         <p:spPr>
           <a:xfrm>
-            <a:off x="4373315" y="1217826"/>
-            <a:ext cx="5207794" cy="6010804"/>
+            <a:off x="4373315" y="1184912"/>
+            <a:ext cx="5207794" cy="5848350"/>
           </a:xfrm>
         </p:spPr>
         <p:txBody>
@@ -2283,8 +2283,8 @@
         </p:nvSpPr>
         <p:spPr>
           <a:xfrm>
-            <a:off x="708571" y="2537460"/>
-            <a:ext cx="3317825" cy="4700959"/>
+            <a:off x="708571" y="2468880"/>
+            <a:ext cx="3317825" cy="4573906"/>
           </a:xfrm>
         </p:spPr>
         <p:txBody>
@@ -2353,7 +2353,7 @@
           <a:p>
             <a:fld id="{DD4E2C3F-D803-BA45-B4A9-CD3B679F1D1E}" type="datetimeFigureOut">
               <a:rPr lang="en-US" smtClean="0"/>
-              <a:t>8/17/21</a:t>
+              <a:t>8/18/21</a:t>
             </a:fld>
             <a:endParaRPr lang="en-US"/>
           </a:p>
@@ -2404,7 +2404,7 @@
     </p:spTree>
     <p:extLst>
       <p:ext uri="{BB962C8B-B14F-4D97-AF65-F5344CB8AC3E}">
-        <p14:creationId xmlns:p14="http://schemas.microsoft.com/office/powerpoint/2010/main" val="1039743754"/>
+        <p14:creationId xmlns:p14="http://schemas.microsoft.com/office/powerpoint/2010/main" val="85361553"/>
       </p:ext>
     </p:extLst>
   </p:cSld>
@@ -2448,8 +2448,8 @@
         </p:nvSpPr>
         <p:spPr>
           <a:xfrm>
-            <a:off x="707231" y="450323"/>
-            <a:ext cx="8872538" cy="1634861"/>
+            <a:off x="707231" y="438152"/>
+            <a:ext cx="8872538" cy="1590676"/>
           </a:xfrm>
           <a:prstGeom prst="rect">
             <a:avLst/>
@@ -2481,8 +2481,8 @@
         </p:nvSpPr>
         <p:spPr>
           <a:xfrm>
-            <a:off x="707231" y="2251604"/>
-            <a:ext cx="8872538" cy="5366650"/>
+            <a:off x="707231" y="2190750"/>
+            <a:ext cx="8872538" cy="5221606"/>
           </a:xfrm>
           <a:prstGeom prst="rect">
             <a:avLst/>
@@ -2543,8 +2543,8 @@
         </p:nvSpPr>
         <p:spPr>
           <a:xfrm>
-            <a:off x="707231" y="7839500"/>
-            <a:ext cx="2314575" cy="450321"/>
+            <a:off x="707231" y="7627622"/>
+            <a:ext cx="2314575" cy="438150"/>
           </a:xfrm>
           <a:prstGeom prst="rect">
             <a:avLst/>
@@ -2566,7 +2566,7 @@
           <a:p>
             <a:fld id="{DD4E2C3F-D803-BA45-B4A9-CD3B679F1D1E}" type="datetimeFigureOut">
               <a:rPr lang="en-US" smtClean="0"/>
-              <a:t>8/17/21</a:t>
+              <a:t>8/18/21</a:t>
             </a:fld>
             <a:endParaRPr lang="en-US"/>
           </a:p>
@@ -2584,8 +2584,8 @@
         </p:nvSpPr>
         <p:spPr>
           <a:xfrm>
-            <a:off x="3407569" y="7839500"/>
-            <a:ext cx="3471863" cy="450321"/>
+            <a:off x="3407569" y="7627622"/>
+            <a:ext cx="3471863" cy="438150"/>
           </a:xfrm>
           <a:prstGeom prst="rect">
             <a:avLst/>
@@ -2621,8 +2621,8 @@
         </p:nvSpPr>
         <p:spPr>
           <a:xfrm>
-            <a:off x="7265194" y="7839500"/>
-            <a:ext cx="2314575" cy="450321"/>
+            <a:off x="7265194" y="7627622"/>
+            <a:ext cx="2314575" cy="438150"/>
           </a:xfrm>
           <a:prstGeom prst="rect">
             <a:avLst/>
@@ -2653,23 +2653,23 @@
     </p:spTree>
     <p:extLst>
       <p:ext uri="{BB962C8B-B14F-4D97-AF65-F5344CB8AC3E}">
-        <p14:creationId xmlns:p14="http://schemas.microsoft.com/office/powerpoint/2010/main" val="547484713"/>
+        <p14:creationId xmlns:p14="http://schemas.microsoft.com/office/powerpoint/2010/main" val="805095451"/>
       </p:ext>
     </p:extLst>
   </p:cSld>
   <p:clrMap bg1="lt1" tx1="dk1" bg2="lt2" tx2="dk2" accent1="accent1" accent2="accent2" accent3="accent3" accent4="accent4" accent5="accent5" accent6="accent6" hlink="hlink" folHlink="folHlink"/>
   <p:sldLayoutIdLst>
-    <p:sldLayoutId id="2147483757" r:id="rId1"/>
-    <p:sldLayoutId id="2147483758" r:id="rId2"/>
-    <p:sldLayoutId id="2147483759" r:id="rId3"/>
-    <p:sldLayoutId id="2147483760" r:id="rId4"/>
-    <p:sldLayoutId id="2147483761" r:id="rId5"/>
-    <p:sldLayoutId id="2147483762" r:id="rId6"/>
-    <p:sldLayoutId id="2147483763" r:id="rId7"/>
-    <p:sldLayoutId id="2147483764" r:id="rId8"/>
-    <p:sldLayoutId id="2147483765" r:id="rId9"/>
-    <p:sldLayoutId id="2147483766" r:id="rId10"/>
-    <p:sldLayoutId id="2147483767" r:id="rId11"/>
+    <p:sldLayoutId id="2147483769" r:id="rId1"/>
+    <p:sldLayoutId id="2147483770" r:id="rId2"/>
+    <p:sldLayoutId id="2147483771" r:id="rId3"/>
+    <p:sldLayoutId id="2147483772" r:id="rId4"/>
+    <p:sldLayoutId id="2147483773" r:id="rId5"/>
+    <p:sldLayoutId id="2147483774" r:id="rId6"/>
+    <p:sldLayoutId id="2147483775" r:id="rId7"/>
+    <p:sldLayoutId id="2147483776" r:id="rId8"/>
+    <p:sldLayoutId id="2147483777" r:id="rId9"/>
+    <p:sldLayoutId id="2147483778" r:id="rId10"/>
+    <p:sldLayoutId id="2147483779" r:id="rId11"/>
   </p:sldLayoutIdLst>
   <p:txStyles>
     <p:titleStyle>
@@ -2973,10 +2973,10 @@
       </p:grpSpPr>
       <p:pic>
         <p:nvPicPr>
-          <p:cNvPr id="4" name="Picture 3">
+          <p:cNvPr id="14" name="Picture 13">
             <a:extLst>
               <a:ext uri="{FF2B5EF4-FFF2-40B4-BE49-F238E27FC236}">
-                <a16:creationId xmlns:a16="http://schemas.microsoft.com/office/drawing/2014/main" id="{6E651191-8483-A443-86D7-A812B2195750}"/>
+                <a16:creationId xmlns:a16="http://schemas.microsoft.com/office/drawing/2014/main" id="{1AFBFC6A-44B2-A74A-9247-7049E1ABFF38}"/>
               </a:ext>
             </a:extLst>
           </p:cNvPr>
@@ -2993,8 +2993,8 @@
         </p:blipFill>
         <p:spPr>
           <a:xfrm>
-            <a:off x="0" y="-26129"/>
-            <a:ext cx="10287000" cy="6957481"/>
+            <a:off x="-1" y="6989832"/>
+            <a:ext cx="10287000" cy="1239768"/>
           </a:xfrm>
           <a:prstGeom prst="rect">
             <a:avLst/>
@@ -3003,10 +3003,10 @@
       </p:pic>
       <p:pic>
         <p:nvPicPr>
-          <p:cNvPr id="17" name="Picture 16">
+          <p:cNvPr id="6" name="Picture 5">
             <a:extLst>
               <a:ext uri="{FF2B5EF4-FFF2-40B4-BE49-F238E27FC236}">
-                <a16:creationId xmlns:a16="http://schemas.microsoft.com/office/drawing/2014/main" id="{194375AE-69A4-4F43-A588-F4AE9ACC36D7}"/>
+                <a16:creationId xmlns:a16="http://schemas.microsoft.com/office/drawing/2014/main" id="{7A2A2D5C-3B07-2E47-8FCD-EC32AD5E29E4}"/>
               </a:ext>
             </a:extLst>
           </p:cNvPr>
@@ -3023,8 +3023,8 @@
         </p:blipFill>
         <p:spPr>
           <a:xfrm>
-            <a:off x="0" y="6900440"/>
-            <a:ext cx="10287000" cy="1552975"/>
+            <a:off x="-1" y="10691"/>
+            <a:ext cx="10287000" cy="6979795"/>
           </a:xfrm>
           <a:prstGeom prst="rect">
             <a:avLst/>
@@ -3052,7 +3052,7 @@
         </p:blipFill>
         <p:spPr>
           <a:xfrm>
-            <a:off x="9039103" y="8218909"/>
+            <a:off x="9110915" y="7995686"/>
             <a:ext cx="1176085" cy="201256"/>
           </a:xfrm>
           <a:prstGeom prst="rect">

</xml_diff>

<commit_message>
update lineage coloring in figures
</commit_message>
<xml_diff>
--- a/analysis/plots/fig1.pptx
+++ b/analysis/plots/fig1.pptx
@@ -243,7 +243,7 @@
           <a:p>
             <a:fld id="{DD4E2C3F-D803-BA45-B4A9-CD3B679F1D1E}" type="datetimeFigureOut">
               <a:rPr lang="en-US" smtClean="0"/>
-              <a:t>9/15/21</a:t>
+              <a:t>12/20/21</a:t>
             </a:fld>
             <a:endParaRPr lang="en-US"/>
           </a:p>
@@ -413,7 +413,7 @@
           <a:p>
             <a:fld id="{DD4E2C3F-D803-BA45-B4A9-CD3B679F1D1E}" type="datetimeFigureOut">
               <a:rPr lang="en-US" smtClean="0"/>
-              <a:t>9/15/21</a:t>
+              <a:t>12/20/21</a:t>
             </a:fld>
             <a:endParaRPr lang="en-US"/>
           </a:p>
@@ -593,7 +593,7 @@
           <a:p>
             <a:fld id="{DD4E2C3F-D803-BA45-B4A9-CD3B679F1D1E}" type="datetimeFigureOut">
               <a:rPr lang="en-US" smtClean="0"/>
-              <a:t>9/15/21</a:t>
+              <a:t>12/20/21</a:t>
             </a:fld>
             <a:endParaRPr lang="en-US"/>
           </a:p>
@@ -763,7 +763,7 @@
           <a:p>
             <a:fld id="{DD4E2C3F-D803-BA45-B4A9-CD3B679F1D1E}" type="datetimeFigureOut">
               <a:rPr lang="en-US" smtClean="0"/>
-              <a:t>9/15/21</a:t>
+              <a:t>12/20/21</a:t>
             </a:fld>
             <a:endParaRPr lang="en-US"/>
           </a:p>
@@ -1007,7 +1007,7 @@
           <a:p>
             <a:fld id="{DD4E2C3F-D803-BA45-B4A9-CD3B679F1D1E}" type="datetimeFigureOut">
               <a:rPr lang="en-US" smtClean="0"/>
-              <a:t>9/15/21</a:t>
+              <a:t>12/20/21</a:t>
             </a:fld>
             <a:endParaRPr lang="en-US"/>
           </a:p>
@@ -1239,7 +1239,7 @@
           <a:p>
             <a:fld id="{DD4E2C3F-D803-BA45-B4A9-CD3B679F1D1E}" type="datetimeFigureOut">
               <a:rPr lang="en-US" smtClean="0"/>
-              <a:t>9/15/21</a:t>
+              <a:t>12/20/21</a:t>
             </a:fld>
             <a:endParaRPr lang="en-US"/>
           </a:p>
@@ -1606,7 +1606,7 @@
           <a:p>
             <a:fld id="{DD4E2C3F-D803-BA45-B4A9-CD3B679F1D1E}" type="datetimeFigureOut">
               <a:rPr lang="en-US" smtClean="0"/>
-              <a:t>9/15/21</a:t>
+              <a:t>12/20/21</a:t>
             </a:fld>
             <a:endParaRPr lang="en-US"/>
           </a:p>
@@ -1724,7 +1724,7 @@
           <a:p>
             <a:fld id="{DD4E2C3F-D803-BA45-B4A9-CD3B679F1D1E}" type="datetimeFigureOut">
               <a:rPr lang="en-US" smtClean="0"/>
-              <a:t>9/15/21</a:t>
+              <a:t>12/20/21</a:t>
             </a:fld>
             <a:endParaRPr lang="en-US"/>
           </a:p>
@@ -1819,7 +1819,7 @@
           <a:p>
             <a:fld id="{DD4E2C3F-D803-BA45-B4A9-CD3B679F1D1E}" type="datetimeFigureOut">
               <a:rPr lang="en-US" smtClean="0"/>
-              <a:t>9/15/21</a:t>
+              <a:t>12/20/21</a:t>
             </a:fld>
             <a:endParaRPr lang="en-US"/>
           </a:p>
@@ -2096,7 +2096,7 @@
           <a:p>
             <a:fld id="{DD4E2C3F-D803-BA45-B4A9-CD3B679F1D1E}" type="datetimeFigureOut">
               <a:rPr lang="en-US" smtClean="0"/>
-              <a:t>9/15/21</a:t>
+              <a:t>12/20/21</a:t>
             </a:fld>
             <a:endParaRPr lang="en-US"/>
           </a:p>
@@ -2353,7 +2353,7 @@
           <a:p>
             <a:fld id="{DD4E2C3F-D803-BA45-B4A9-CD3B679F1D1E}" type="datetimeFigureOut">
               <a:rPr lang="en-US" smtClean="0"/>
-              <a:t>9/15/21</a:t>
+              <a:t>12/20/21</a:t>
             </a:fld>
             <a:endParaRPr lang="en-US"/>
           </a:p>
@@ -2566,7 +2566,7 @@
           <a:p>
             <a:fld id="{DD4E2C3F-D803-BA45-B4A9-CD3B679F1D1E}" type="datetimeFigureOut">
               <a:rPr lang="en-US" smtClean="0"/>
-              <a:t>9/15/21</a:t>
+              <a:t>12/20/21</a:t>
             </a:fld>
             <a:endParaRPr lang="en-US"/>
           </a:p>
@@ -3032,10 +3032,10 @@
       </p:pic>
       <p:pic>
         <p:nvPicPr>
-          <p:cNvPr id="9" name="Picture 8">
+          <p:cNvPr id="3" name="Picture 2">
             <a:extLst>
               <a:ext uri="{FF2B5EF4-FFF2-40B4-BE49-F238E27FC236}">
-                <a16:creationId xmlns:a16="http://schemas.microsoft.com/office/drawing/2014/main" id="{E1F6E2A9-4F99-FE48-8039-B2F1C9AB3DBA}"/>
+                <a16:creationId xmlns:a16="http://schemas.microsoft.com/office/drawing/2014/main" id="{6A2CDD84-D3C0-3642-B4C1-9CF4810CC7D2}"/>
               </a:ext>
             </a:extLst>
           </p:cNvPr>
@@ -3053,7 +3053,7 @@
         <p:spPr>
           <a:xfrm>
             <a:off x="0" y="0"/>
-            <a:ext cx="10287000" cy="7018146"/>
+            <a:ext cx="10287000" cy="7011725"/>
           </a:xfrm>
           <a:prstGeom prst="rect">
             <a:avLst/>

</xml_diff>